<commit_message>
Added changes suggested by Dr. Ho.
</commit_message>
<xml_diff>
--- a/Thesis Defense Presentation.pptx
+++ b/Thesis Defense Presentation.pptx
@@ -9874,7 +9874,7 @@
               <a:rPr lang="en-US" sz="2000" dirty="0">
                 <a:latin typeface="Bookman Old Style" panose="02050604050505020204" pitchFamily="18" charset="0"/>
               </a:rPr>
-              <a:t>3. Finding all motif/clique instances and the degree of every vertex.</a:t>
+              <a:t>3. Finding all motif/clique instances and the motif/clique degree of every vertex.</a:t>
             </a:r>
           </a:p>
           <a:p>
@@ -11421,8 +11421,8 @@
           </a:p>
         </p:txBody>
       </p:sp>
-      <mc:AlternateContent xmlns:mc="http://schemas.openxmlformats.org/markup-compatibility/2006">
-        <mc:Choice xmlns:a14="http://schemas.microsoft.com/office/drawing/2010/main" Requires="a14">
+      <mc:AlternateContent xmlns:mc="http://schemas.openxmlformats.org/markup-compatibility/2006" xmlns:a14="http://schemas.microsoft.com/office/drawing/2010/main">
+        <mc:Choice Requires="a14">
           <p:sp>
             <p:nvSpPr>
               <p:cNvPr id="2" name="Content Placeholder 2">
@@ -12276,7 +12276,7 @@
             </p:txBody>
           </p:sp>
         </mc:Choice>
-        <mc:Fallback>
+        <mc:Fallback xmlns="">
           <p:sp>
             <p:nvSpPr>
               <p:cNvPr id="2" name="Content Placeholder 2">
@@ -13154,8 +13154,8 @@
           </a:p>
         </p:txBody>
       </p:sp>
-      <mc:AlternateContent xmlns:mc="http://schemas.openxmlformats.org/markup-compatibility/2006">
-        <mc:Choice xmlns:a14="http://schemas.microsoft.com/office/drawing/2010/main" Requires="a14">
+      <mc:AlternateContent xmlns:mc="http://schemas.openxmlformats.org/markup-compatibility/2006" xmlns:a14="http://schemas.microsoft.com/office/drawing/2010/main">
+        <mc:Choice Requires="a14">
           <p:sp>
             <p:nvSpPr>
               <p:cNvPr id="2" name="Content Placeholder 2">
@@ -13506,7 +13506,7 @@
             </p:txBody>
           </p:sp>
         </mc:Choice>
-        <mc:Fallback>
+        <mc:Fallback xmlns="">
           <p:sp>
             <p:nvSpPr>
               <p:cNvPr id="2" name="Content Placeholder 2">

</xml_diff>